<commit_message>
Update Video Game Dashboard Mockup.pptx
updated mock up
</commit_message>
<xml_diff>
--- a/Video Game Dashboard Mockup.pptx
+++ b/Video Game Dashboard Mockup.pptx
@@ -107,6 +107,11 @@
       </a:defRPr>
     </a:lvl9pPr>
   </p:defaultTextStyle>
+  <p:extLst>
+    <p:ext uri="{EFAFB233-063F-42B5-8137-9DF3F51BA10A}">
+      <p15:sldGuideLst xmlns:p15="http://schemas.microsoft.com/office/powerpoint/2012/main"/>
+    </p:ext>
+  </p:extLst>
 </p:presentation>
 </file>
 
@@ -12441,7 +12446,7 @@
         </p:blipFill>
         <p:spPr>
           <a:xfrm>
-            <a:off x="2064331" y="3330356"/>
+            <a:off x="1853433" y="1765325"/>
             <a:ext cx="1790334" cy="1987937"/>
           </a:xfrm>
           <a:prstGeom prst="rect">
@@ -12467,7 +12472,7 @@
         </p:nvSpPr>
         <p:spPr>
           <a:xfrm>
-            <a:off x="420103" y="2289511"/>
+            <a:off x="209205" y="724480"/>
             <a:ext cx="7886700" cy="484749"/>
           </a:xfrm>
         </p:spPr>
@@ -12498,7 +12503,7 @@
         </p:nvSpPr>
         <p:spPr>
           <a:xfrm>
-            <a:off x="531803" y="4385595"/>
+            <a:off x="320905" y="2820564"/>
             <a:ext cx="1498386" cy="715581"/>
           </a:xfrm>
           <a:prstGeom prst="rect">
@@ -12547,7 +12552,7 @@
         </p:nvSpPr>
         <p:spPr>
           <a:xfrm>
-            <a:off x="629338" y="7452795"/>
+            <a:off x="418440" y="5887764"/>
             <a:ext cx="1498386" cy="715581"/>
           </a:xfrm>
           <a:prstGeom prst="rect">
@@ -12596,7 +12601,7 @@
         </p:nvSpPr>
         <p:spPr>
           <a:xfrm>
-            <a:off x="395207" y="3330356"/>
+            <a:off x="184309" y="1765325"/>
             <a:ext cx="1687389" cy="577081"/>
           </a:xfrm>
           <a:prstGeom prst="rect">
@@ -12646,7 +12651,7 @@
         </p:nvSpPr>
         <p:spPr>
           <a:xfrm>
-            <a:off x="395206" y="6336170"/>
+            <a:off x="184308" y="4771139"/>
             <a:ext cx="1732518" cy="577081"/>
           </a:xfrm>
           <a:prstGeom prst="rect">
@@ -12704,7 +12709,7 @@
         </p:blipFill>
         <p:spPr>
           <a:xfrm>
-            <a:off x="2109293" y="5923092"/>
+            <a:off x="1898395" y="4358061"/>
             <a:ext cx="1745373" cy="1938014"/>
           </a:xfrm>
           <a:prstGeom prst="rect">
@@ -12734,7 +12739,7 @@
         </p:blipFill>
         <p:spPr>
           <a:xfrm>
-            <a:off x="2483621" y="3654157"/>
+            <a:off x="2331766" y="2291802"/>
             <a:ext cx="2088379" cy="1657150"/>
           </a:xfrm>
           <a:prstGeom prst="rect">
@@ -12764,7 +12769,7 @@
         </p:blipFill>
         <p:spPr>
           <a:xfrm>
-            <a:off x="2501907" y="6249841"/>
+            <a:off x="2291009" y="4684810"/>
             <a:ext cx="1823949" cy="2025262"/>
           </a:xfrm>
           <a:prstGeom prst="rect">
@@ -12786,7 +12791,7 @@
         </p:nvSpPr>
         <p:spPr>
           <a:xfrm>
-            <a:off x="4670741" y="3242782"/>
+            <a:off x="4459843" y="1677751"/>
             <a:ext cx="4580020" cy="369332"/>
           </a:xfrm>
           <a:prstGeom prst="rect">
@@ -12822,7 +12827,7 @@
         </p:nvSpPr>
         <p:spPr>
           <a:xfrm>
-            <a:off x="4670741" y="5923092"/>
+            <a:off x="4459843" y="4358061"/>
             <a:ext cx="4580020" cy="369332"/>
           </a:xfrm>
           <a:prstGeom prst="rect">
@@ -12866,7 +12871,7 @@
         </p:blipFill>
         <p:spPr>
           <a:xfrm>
-            <a:off x="5287812" y="3654157"/>
+            <a:off x="5076914" y="2089126"/>
             <a:ext cx="3583713" cy="1348002"/>
           </a:xfrm>
           <a:prstGeom prst="rect">
@@ -12896,7 +12901,7 @@
         </p:blipFill>
         <p:spPr>
           <a:xfrm>
-            <a:off x="5091606" y="6482466"/>
+            <a:off x="4880708" y="4917435"/>
             <a:ext cx="3886201" cy="1461782"/>
           </a:xfrm>
           <a:prstGeom prst="rect">
@@ -12920,7 +12925,7 @@
         </p:nvCxnSpPr>
         <p:spPr>
           <a:xfrm>
-            <a:off x="4670741" y="4345670"/>
+            <a:off x="4459843" y="2780639"/>
             <a:ext cx="666929" cy="0"/>
           </a:xfrm>
           <a:prstGeom prst="straightConnector1">
@@ -12961,7 +12966,7 @@
         </p:nvCxnSpPr>
         <p:spPr>
           <a:xfrm>
-            <a:off x="4424677" y="7110642"/>
+            <a:off x="4213779" y="5545611"/>
             <a:ext cx="666929" cy="0"/>
           </a:xfrm>
           <a:prstGeom prst="straightConnector1">
@@ -13008,7 +13013,7 @@
         </p:blipFill>
         <p:spPr>
           <a:xfrm>
-            <a:off x="5747880" y="4154197"/>
+            <a:off x="5536982" y="2589166"/>
             <a:ext cx="3132753" cy="1178375"/>
           </a:xfrm>
           <a:prstGeom prst="rect">
@@ -13038,7 +13043,7 @@
         </p:blipFill>
         <p:spPr>
           <a:xfrm>
-            <a:off x="5653810" y="6813314"/>
+            <a:off x="5442912" y="5248283"/>
             <a:ext cx="3701088" cy="1392152"/>
           </a:xfrm>
           <a:prstGeom prst="rect">
@@ -13227,7 +13232,7 @@
             <a:pPr algn="ctr"/>
             <a:r>
               <a:rPr lang="en-US" sz="700" dirty="0"/>
-              <a:t>Global | N. America | Europe | Asia | Japan</a:t>
+              <a:t>N. America | Europe | Asia | Japan</a:t>
             </a:r>
           </a:p>
         </p:txBody>
@@ -14910,7 +14915,7 @@
         </p:blipFill>
         <p:spPr>
           <a:xfrm>
-            <a:off x="2062507" y="1992020"/>
+            <a:off x="1947082" y="1992020"/>
             <a:ext cx="1552867" cy="1065737"/>
           </a:xfrm>
           <a:prstGeom prst="rect">

</xml_diff>

<commit_message>
Finished draft of genre panel
</commit_message>
<xml_diff>
--- a/Video Game Dashboard Mockup.pptx
+++ b/Video Game Dashboard Mockup.pptx
@@ -2009,7 +2009,7 @@
           <a:p>
             <a:fld id="{0DAF61AA-5A98-4049-A93E-477E5505141A}" type="datetimeFigureOut">
               <a:rPr lang="en-US" smtClean="0"/>
-              <a:t>7/29/23</a:t>
+              <a:t>7/31/23</a:t>
             </a:fld>
             <a:endParaRPr lang="en-US" dirty="0"/>
           </a:p>
@@ -2207,7 +2207,7 @@
           <a:p>
             <a:fld id="{0DAF61AA-5A98-4049-A93E-477E5505141A}" type="datetimeFigureOut">
               <a:rPr lang="en-US" smtClean="0"/>
-              <a:t>7/29/23</a:t>
+              <a:t>7/31/23</a:t>
             </a:fld>
             <a:endParaRPr lang="en-US"/>
           </a:p>
@@ -2415,7 +2415,7 @@
           <a:p>
             <a:fld id="{0DAF61AA-5A98-4049-A93E-477E5505141A}" type="datetimeFigureOut">
               <a:rPr lang="en-US" smtClean="0"/>
-              <a:t>7/29/23</a:t>
+              <a:t>7/31/23</a:t>
             </a:fld>
             <a:endParaRPr lang="en-US"/>
           </a:p>
@@ -2613,7 +2613,7 @@
           <a:p>
             <a:fld id="{0DAF61AA-5A98-4049-A93E-477E5505141A}" type="datetimeFigureOut">
               <a:rPr lang="en-US" smtClean="0"/>
-              <a:t>7/29/23</a:t>
+              <a:t>7/31/23</a:t>
             </a:fld>
             <a:endParaRPr lang="en-US"/>
           </a:p>
@@ -2888,7 +2888,7 @@
           <a:p>
             <a:fld id="{0DAF61AA-5A98-4049-A93E-477E5505141A}" type="datetimeFigureOut">
               <a:rPr lang="en-US" smtClean="0"/>
-              <a:t>7/29/23</a:t>
+              <a:t>7/31/23</a:t>
             </a:fld>
             <a:endParaRPr lang="en-US"/>
           </a:p>
@@ -3153,7 +3153,7 @@
           <a:p>
             <a:fld id="{0DAF61AA-5A98-4049-A93E-477E5505141A}" type="datetimeFigureOut">
               <a:rPr lang="en-US" smtClean="0"/>
-              <a:t>7/29/23</a:t>
+              <a:t>7/31/23</a:t>
             </a:fld>
             <a:endParaRPr lang="en-US"/>
           </a:p>
@@ -3565,7 +3565,7 @@
           <a:p>
             <a:fld id="{0DAF61AA-5A98-4049-A93E-477E5505141A}" type="datetimeFigureOut">
               <a:rPr lang="en-US" smtClean="0"/>
-              <a:t>7/29/23</a:t>
+              <a:t>7/31/23</a:t>
             </a:fld>
             <a:endParaRPr lang="en-US"/>
           </a:p>
@@ -3706,7 +3706,7 @@
           <a:p>
             <a:fld id="{0DAF61AA-5A98-4049-A93E-477E5505141A}" type="datetimeFigureOut">
               <a:rPr lang="en-US" smtClean="0"/>
-              <a:t>7/29/23</a:t>
+              <a:t>7/31/23</a:t>
             </a:fld>
             <a:endParaRPr lang="en-US"/>
           </a:p>
@@ -3819,7 +3819,7 @@
           <a:p>
             <a:fld id="{0DAF61AA-5A98-4049-A93E-477E5505141A}" type="datetimeFigureOut">
               <a:rPr lang="en-US" smtClean="0"/>
-              <a:t>7/29/23</a:t>
+              <a:t>7/31/23</a:t>
             </a:fld>
             <a:endParaRPr lang="en-US"/>
           </a:p>
@@ -4130,7 +4130,7 @@
           <a:p>
             <a:fld id="{0DAF61AA-5A98-4049-A93E-477E5505141A}" type="datetimeFigureOut">
               <a:rPr lang="en-US" smtClean="0"/>
-              <a:t>7/29/23</a:t>
+              <a:t>7/31/23</a:t>
             </a:fld>
             <a:endParaRPr lang="en-US"/>
           </a:p>
@@ -4421,7 +4421,7 @@
           <a:p>
             <a:fld id="{0DAF61AA-5A98-4049-A93E-477E5505141A}" type="datetimeFigureOut">
               <a:rPr lang="en-US" smtClean="0"/>
-              <a:t>7/29/23</a:t>
+              <a:t>7/31/23</a:t>
             </a:fld>
             <a:endParaRPr lang="en-US"/>
           </a:p>
@@ -8109,7 +8109,7 @@
             <a:fld id="{0DAF61AA-5A98-4049-A93E-477E5505141A}" type="datetimeFigureOut">
               <a:rPr lang="en-US" smtClean="0"/>
               <a:pPr/>
-              <a:t>7/29/23</a:t>
+              <a:t>7/31/23</a:t>
             </a:fld>
             <a:endParaRPr lang="en-US" dirty="0"/>
           </a:p>
@@ -10342,7 +10342,7 @@
         <p:spPr>
           <a:xfrm>
             <a:off x="754241" y="3473332"/>
-            <a:ext cx="3598835" cy="2366564"/>
+            <a:ext cx="7400165" cy="2366564"/>
           </a:xfrm>
         </p:spPr>
         <p:txBody>
@@ -10351,10 +10351,16 @@
           </a:bodyPr>
           <a:lstStyle/>
           <a:p>
-            <a:pPr algn="l"/>
             <a:r>
               <a:rPr lang="en-US" sz="4050" dirty="0"/>
-              <a:t>Video game sales</a:t>
+              <a:t>Video Game Dashboard</a:t>
+            </a:r>
+            <a:br>
+              <a:rPr lang="en-US" sz="4050" dirty="0"/>
+            </a:br>
+            <a:r>
+              <a:rPr lang="en-US" sz="4050" dirty="0"/>
+              <a:t>Mock-Up</a:t>
             </a:r>
           </a:p>
         </p:txBody>
@@ -10377,8 +10383,8 @@
         </p:nvSpPr>
         <p:spPr>
           <a:xfrm>
-            <a:off x="759590" y="5970738"/>
-            <a:ext cx="3598835" cy="1540730"/>
+            <a:off x="1492143" y="5952690"/>
+            <a:ext cx="5858226" cy="1540730"/>
           </a:xfrm>
         </p:spPr>
         <p:txBody>
@@ -10387,40 +10393,26 @@
           </a:bodyPr>
           <a:lstStyle/>
           <a:p>
-            <a:pPr algn="l"/>
-            <a:endParaRPr lang="en-US" sz="1650"/>
+            <a:r>
+              <a:rPr lang="en-US" sz="1650" dirty="0"/>
+              <a:t>Design by: Rachel Shaw</a:t>
+            </a:r>
+          </a:p>
+          <a:p>
+            <a:r>
+              <a:rPr lang="en-US" sz="1650" dirty="0"/>
+              <a:t>Database by: Gregory Smith via </a:t>
+            </a:r>
+            <a:r>
+              <a:rPr lang="en-US" sz="1650" dirty="0">
+                <a:hlinkClick r:id="rId2"/>
+              </a:rPr>
+              <a:t>Kaggle</a:t>
+            </a:r>
+            <a:endParaRPr lang="en-US" sz="1650" dirty="0"/>
           </a:p>
         </p:txBody>
       </p:sp>
-      <p:pic>
-        <p:nvPicPr>
-          <p:cNvPr id="4" name="Picture 3" descr="Colored pencils inside a pencil holder which is on top of a wood table">
-            <a:extLst>
-              <a:ext uri="{FF2B5EF4-FFF2-40B4-BE49-F238E27FC236}">
-                <a16:creationId xmlns:a16="http://schemas.microsoft.com/office/drawing/2014/main" id="{86D1F72A-8B44-3412-CB69-476810995C48}"/>
-              </a:ext>
-            </a:extLst>
-          </p:cNvPr>
-          <p:cNvPicPr>
-            <a:picLocks noChangeAspect="1"/>
-          </p:cNvPicPr>
-          <p:nvPr/>
-        </p:nvPicPr>
-        <p:blipFill rotWithShape="1">
-          <a:blip r:embed="rId2"/>
-          <a:srcRect l="39700" r="-1" b="-1"/>
-          <a:stretch/>
-        </p:blipFill>
-        <p:spPr>
-          <a:xfrm>
-            <a:off x="4497472" y="2914658"/>
-            <a:ext cx="4646529" cy="5143493"/>
-          </a:xfrm>
-          <a:prstGeom prst="rect">
-            <a:avLst/>
-          </a:prstGeom>
-        </p:spPr>
-      </p:pic>
       <p:grpSp>
         <p:nvGrpSpPr>
           <p:cNvPr id="23" name="Cross">

</xml_diff>